<commit_message>
UPDATE 3 Documento PowerPoint Criterios Aceptación
</commit_message>
<xml_diff>
--- a/docs/R3 - Reto Caso Práctico [Equipo 2] - CRITERIOS ACEPTACIÓN.pptx
+++ b/docs/R3 - Reto Caso Práctico [Equipo 2] - CRITERIOS ACEPTACIÓN.pptx
@@ -7776,7 +7776,7 @@
         </p:spPr>
         <p:txBody>
           <a:bodyPr>
-            <a:normAutofit fontScale="40000" lnSpcReduction="20000"/>
+            <a:normAutofit fontScale="32500" lnSpcReduction="20000"/>
           </a:bodyPr>
           <a:lstStyle>
             <a:lvl1pPr marL="449263" indent="-449263" algn="l" defTabSz="914400" rtl="0" eaLnBrk="1" latinLnBrk="0" hangingPunct="1">
@@ -8221,13 +8221,76 @@
             </a:pPr>
             <a:r>
               <a:rPr lang="es-ES" dirty="0"/>
-              <a:t>Se genera una excepción </a:t>
+              <a:t>No se encuentra el cliente (“Cliente NO encontrado!”).</a:t>
+            </a:r>
+          </a:p>
+          <a:p>
+            <a:pPr lvl="2">
+              <a:buFont typeface="Courier New" panose="02070309020205020404" pitchFamily="49" charset="0"/>
+              <a:buChar char="o"/>
+            </a:pPr>
+            <a:r>
+              <a:rPr lang="es-ES" dirty="0"/>
+              <a:t>Se genera una </a:t>
+            </a:r>
+            <a:r>
+              <a:rPr lang="es-ES"/>
+              <a:t>excepción interna </a:t>
             </a:r>
             <a:r>
               <a:rPr lang="es-ES" dirty="0" err="1"/>
               <a:t>ClienteException</a:t>
             </a:r>
-            <a:endParaRPr lang="es-ES" dirty="0"/>
+            <a:r>
+              <a:rPr lang="es-ES" dirty="0"/>
+              <a:t> en ClientesController.java </a:t>
+            </a:r>
+            <a:r>
+              <a:rPr lang="es-ES" dirty="0">
+                <a:sym typeface="Wingdings" panose="05000000000000000000" pitchFamily="2" charset="2"/>
+              </a:rPr>
+              <a:t></a:t>
+            </a:r>
+            <a:r>
+              <a:rPr lang="es-ES" dirty="0" err="1">
+                <a:sym typeface="Wingdings" panose="05000000000000000000" pitchFamily="2" charset="2"/>
+              </a:rPr>
+              <a:t>mostrarDetalle</a:t>
+            </a:r>
+            <a:r>
+              <a:rPr lang="es-ES" dirty="0">
+                <a:sym typeface="Wingdings" panose="05000000000000000000" pitchFamily="2" charset="2"/>
+              </a:rPr>
+              <a:t>(</a:t>
+            </a:r>
+            <a:r>
+              <a:rPr lang="es-ES" dirty="0" err="1">
+                <a:sym typeface="Wingdings" panose="05000000000000000000" pitchFamily="2" charset="2"/>
+              </a:rPr>
+              <a:t>Integer</a:t>
+            </a:r>
+            <a:r>
+              <a:rPr lang="es-ES" dirty="0">
+                <a:sym typeface="Wingdings" panose="05000000000000000000" pitchFamily="2" charset="2"/>
+              </a:rPr>
+              <a:t> </a:t>
+            </a:r>
+            <a:r>
+              <a:rPr lang="es-ES" dirty="0" err="1">
+                <a:sym typeface="Wingdings" panose="05000000000000000000" pitchFamily="2" charset="2"/>
+              </a:rPr>
+              <a:t>uid</a:t>
+            </a:r>
+            <a:r>
+              <a:rPr lang="es-ES" dirty="0">
+                <a:sym typeface="Wingdings" panose="05000000000000000000" pitchFamily="2" charset="2"/>
+              </a:rPr>
+              <a:t>)</a:t>
+            </a:r>
+            <a:r>
+              <a:rPr lang="es-ES" dirty="0"/>
+              <a:t> que no devuelve, por lo que es transparente para nuestro test.</a:t>
+            </a:r>
           </a:p>
           <a:p>
             <a:pPr marL="0" indent="0">
@@ -37698,15 +37761,6 @@
 </file>
 
 <file path=customXml/item2.xml><?xml version="1.0" encoding="utf-8"?>
-<p:properties xmlns:p="http://schemas.microsoft.com/office/2006/metadata/properties" xmlns:xsi="http://www.w3.org/2001/XMLSchema-instance" xmlns:pc="http://schemas.microsoft.com/office/infopath/2007/PartnerControls">
-  <documentManagement>
-    <Status_x0020_Development xmlns="975b7f9a-800d-415b-98b3-08f16f55d7f0">To-Do</Status_x0020_Development>
-    <_Flow_SignoffStatus xmlns="975b7f9a-800d-415b-98b3-08f16f55d7f0" xsi:nil="true"/>
-  </documentManagement>
-</p:properties>
-</file>
-
-<file path=customXml/item3.xml><?xml version="1.0" encoding="utf-8"?>
 <ct:contentTypeSchema xmlns:ct="http://schemas.microsoft.com/office/2006/metadata/contentType" xmlns:ma="http://schemas.microsoft.com/office/2006/metadata/properties/metaAttributes" ct:_="" ma:_="" ma:contentTypeName="Documento" ma:contentTypeID="0x0101008FB666A76BAB7B428301D6190BC85A20" ma:contentTypeVersion="15" ma:contentTypeDescription="Crear nuevo documento." ma:contentTypeScope="" ma:versionID="866ae61b60d406a07f042717c7cfadc9">
   <xsd:schema xmlns:xsd="http://www.w3.org/2001/XMLSchema" xmlns:xs="http://www.w3.org/2001/XMLSchema" xmlns:p="http://schemas.microsoft.com/office/2006/metadata/properties" xmlns:ns2="975b7f9a-800d-415b-98b3-08f16f55d7f0" xmlns:ns3="241fe39d-e5a7-4413-ac3b-f4a3728cd94d" targetNamespace="http://schemas.microsoft.com/office/2006/metadata/properties" ma:root="true" ma:fieldsID="438263c34cbfa58323e0b878b493a1b0" ns2:_="" ns3:_="">
     <xsd:import namespace="975b7f9a-800d-415b-98b3-08f16f55d7f0"/>
@@ -37945,6 +37999,15 @@
 </ct:contentTypeSchema>
 </file>
 
+<file path=customXml/item3.xml><?xml version="1.0" encoding="utf-8"?>
+<p:properties xmlns:p="http://schemas.microsoft.com/office/2006/metadata/properties" xmlns:xsi="http://www.w3.org/2001/XMLSchema-instance" xmlns:pc="http://schemas.microsoft.com/office/infopath/2007/PartnerControls">
+  <documentManagement>
+    <Status_x0020_Development xmlns="975b7f9a-800d-415b-98b3-08f16f55d7f0">To-Do</Status_x0020_Development>
+    <_Flow_SignoffStatus xmlns="975b7f9a-800d-415b-98b3-08f16f55d7f0" xsi:nil="true"/>
+  </documentManagement>
+</p:properties>
+</file>
+
 <file path=customXml/itemProps1.xml><?xml version="1.0" encoding="utf-8"?>
 <ds:datastoreItem xmlns:ds="http://schemas.openxmlformats.org/officeDocument/2006/customXml" ds:itemID="{4D88B97B-74C7-4A34-8B59-6617B59ED0AA}">
   <ds:schemaRefs>
@@ -37954,23 +38017,6 @@
 </file>
 
 <file path=customXml/itemProps2.xml><?xml version="1.0" encoding="utf-8"?>
-<ds:datastoreItem xmlns:ds="http://schemas.openxmlformats.org/officeDocument/2006/customXml" ds:itemID="{2F5F5825-31DA-4AB4-947F-B9359FF0B510}">
-  <ds:schemaRefs>
-    <ds:schemaRef ds:uri="http://purl.org/dc/terms/"/>
-    <ds:schemaRef ds:uri="http://purl.org/dc/dcmitype/"/>
-    <ds:schemaRef ds:uri="http://schemas.openxmlformats.org/package/2006/metadata/core-properties"/>
-    <ds:schemaRef ds:uri="http://schemas.microsoft.com/office/2006/metadata/properties"/>
-    <ds:schemaRef ds:uri="http://schemas.microsoft.com/office/2006/documentManagement/types"/>
-    <ds:schemaRef ds:uri="http://www.w3.org/XML/1998/namespace"/>
-    <ds:schemaRef ds:uri="975b7f9a-800d-415b-98b3-08f16f55d7f0"/>
-    <ds:schemaRef ds:uri="http://purl.org/dc/elements/1.1/"/>
-    <ds:schemaRef ds:uri="http://schemas.microsoft.com/office/infopath/2007/PartnerControls"/>
-    <ds:schemaRef ds:uri="241fe39d-e5a7-4413-ac3b-f4a3728cd94d"/>
-  </ds:schemaRefs>
-</ds:datastoreItem>
-</file>
-
-<file path=customXml/itemProps3.xml><?xml version="1.0" encoding="utf-8"?>
 <ds:datastoreItem xmlns:ds="http://schemas.openxmlformats.org/officeDocument/2006/customXml" ds:itemID="{BE1BD0F2-D04D-44B4-98C9-C4E6C25DD414}">
   <ds:schemaRefs>
     <ds:schemaRef ds:uri="http://schemas.microsoft.com/office/2006/metadata/contentType"/>
@@ -37987,4 +38033,21 @@
     <ds:schemaRef ds:uri="http://schemas.microsoft.com/internal/obd"/>
   </ds:schemaRefs>
 </ds:datastoreItem>
+</file>
+
+<file path=customXml/itemProps3.xml><?xml version="1.0" encoding="utf-8"?>
+<ds:datastoreItem xmlns:ds="http://schemas.openxmlformats.org/officeDocument/2006/customXml" ds:itemID="{2F5F5825-31DA-4AB4-947F-B9359FF0B510}">
+  <ds:schemaRefs>
+    <ds:schemaRef ds:uri="http://purl.org/dc/terms/"/>
+    <ds:schemaRef ds:uri="http://purl.org/dc/dcmitype/"/>
+    <ds:schemaRef ds:uri="http://schemas.openxmlformats.org/package/2006/metadata/core-properties"/>
+    <ds:schemaRef ds:uri="http://schemas.microsoft.com/office/2006/metadata/properties"/>
+    <ds:schemaRef ds:uri="http://schemas.microsoft.com/office/2006/documentManagement/types"/>
+    <ds:schemaRef ds:uri="http://www.w3.org/XML/1998/namespace"/>
+    <ds:schemaRef ds:uri="975b7f9a-800d-415b-98b3-08f16f55d7f0"/>
+    <ds:schemaRef ds:uri="http://purl.org/dc/elements/1.1/"/>
+    <ds:schemaRef ds:uri="http://schemas.microsoft.com/office/infopath/2007/PartnerControls"/>
+    <ds:schemaRef ds:uri="241fe39d-e5a7-4413-ac3b-f4a3728cd94d"/>
+  </ds:schemaRefs>
+</ds:datastoreItem>
 </file>
</xml_diff>